<commit_message>
Expand a column in order to complete the word elemnt.  Looks like a typo but I shortened it in order to fit into a single line.  I expanded the column to allow for the extra character and not break the line...
</commit_message>
<xml_diff>
--- a/Regular expression.pptx
+++ b/Regular expression.pptx
@@ -259,7 +259,7 @@
           <a:p>
             <a:fld id="{8FD72FE2-9D34-441A-BBF8-C43457B3CB86}" type="datetimeFigureOut">
               <a:rPr lang="en-US" smtClean="0"/>
-              <a:t>3/18/2021</a:t>
+              <a:t>3/24/2021</a:t>
             </a:fld>
             <a:endParaRPr lang="en-US"/>
           </a:p>
@@ -3594,7 +3594,7 @@
           <a:p>
             <a:fld id="{C44276A9-7526-4D6F-8860-40780D20FB70}" type="datetime1">
               <a:rPr lang="en-US" smtClean="0"/>
-              <a:t>3/18/2021</a:t>
+              <a:t>3/24/2021</a:t>
             </a:fld>
             <a:endParaRPr lang="en-US"/>
           </a:p>
@@ -3841,7 +3841,7 @@
           <a:p>
             <a:fld id="{DA73BF5B-E6A9-4AD9-9492-C7670EB48B9C}" type="datetime1">
               <a:rPr lang="en-US" smtClean="0"/>
-              <a:t>3/18/2021</a:t>
+              <a:t>3/24/2021</a:t>
             </a:fld>
             <a:endParaRPr lang="en-US"/>
           </a:p>
@@ -4151,7 +4151,7 @@
           <a:p>
             <a:fld id="{35611C89-A768-4986-BC8A-B8AF2ACAC105}" type="datetime1">
               <a:rPr lang="en-US" smtClean="0"/>
-              <a:t>3/18/2021</a:t>
+              <a:t>3/24/2021</a:t>
             </a:fld>
             <a:endParaRPr lang="en-US"/>
           </a:p>
@@ -4488,7 +4488,7 @@
           <a:p>
             <a:fld id="{9A3A3E9E-0A0D-45EA-BEA4-AD822CA400AD}" type="datetime1">
               <a:rPr lang="en-US" smtClean="0"/>
-              <a:t>3/18/2021</a:t>
+              <a:t>3/24/2021</a:t>
             </a:fld>
             <a:endParaRPr lang="en-US"/>
           </a:p>
@@ -4798,7 +4798,7 @@
           <a:p>
             <a:fld id="{ECEBFA12-978A-4BB0-ADD7-3A313390BD79}" type="datetime1">
               <a:rPr lang="en-US" smtClean="0"/>
-              <a:t>3/18/2021</a:t>
+              <a:t>3/24/2021</a:t>
             </a:fld>
             <a:endParaRPr lang="en-US"/>
           </a:p>
@@ -5187,7 +5187,7 @@
           <a:p>
             <a:fld id="{E8DD9845-F79F-4BE7-83DF-9040CC064CF1}" type="datetime1">
               <a:rPr lang="en-US" smtClean="0"/>
-              <a:t>3/18/2021</a:t>
+              <a:t>3/24/2021</a:t>
             </a:fld>
             <a:endParaRPr lang="en-US"/>
           </a:p>
@@ -5353,7 +5353,7 @@
           <a:p>
             <a:fld id="{1E49E2CD-78C6-4946-B39D-64A329306FF6}" type="datetime1">
               <a:rPr lang="en-US" smtClean="0"/>
-              <a:t>3/18/2021</a:t>
+              <a:t>3/24/2021</a:t>
             </a:fld>
             <a:endParaRPr lang="en-US"/>
           </a:p>
@@ -5528,7 +5528,7 @@
           <a:p>
             <a:fld id="{EEE216F6-DF86-456A-8087-621803B16196}" type="datetime1">
               <a:rPr lang="en-US" smtClean="0"/>
-              <a:t>3/18/2021</a:t>
+              <a:t>3/24/2021</a:t>
             </a:fld>
             <a:endParaRPr lang="en-US"/>
           </a:p>
@@ -5700,7 +5700,7 @@
           <a:p>
             <a:fld id="{F9F6332A-FC3F-457D-91BB-C0FFB082B428}" type="datetime1">
               <a:rPr lang="en-US" smtClean="0"/>
-              <a:t>3/18/2021</a:t>
+              <a:t>3/24/2021</a:t>
             </a:fld>
             <a:endParaRPr lang="en-US"/>
           </a:p>
@@ -5943,7 +5943,7 @@
           <a:p>
             <a:fld id="{AB590231-D46D-4502-89B1-B167124EAE52}" type="datetime1">
               <a:rPr lang="en-US" smtClean="0"/>
-              <a:t>3/18/2021</a:t>
+              <a:t>3/24/2021</a:t>
             </a:fld>
             <a:endParaRPr lang="en-US"/>
           </a:p>
@@ -6171,7 +6171,7 @@
           <a:p>
             <a:fld id="{B5AD2EC3-4702-48B0-975B-A65B14A99826}" type="datetime1">
               <a:rPr lang="en-US" smtClean="0"/>
-              <a:t>3/18/2021</a:t>
+              <a:t>3/24/2021</a:t>
             </a:fld>
             <a:endParaRPr lang="en-US"/>
           </a:p>
@@ -6540,7 +6540,7 @@
           <a:p>
             <a:fld id="{CA41493D-1E6A-4BBB-BB5B-DFB8D6DDCE8C}" type="datetime1">
               <a:rPr lang="en-US" smtClean="0"/>
-              <a:t>3/18/2021</a:t>
+              <a:t>3/24/2021</a:t>
             </a:fld>
             <a:endParaRPr lang="en-US"/>
           </a:p>
@@ -6659,7 +6659,7 @@
           <a:p>
             <a:fld id="{F593F7B0-3813-49F5-BD38-B8089D3A91C4}" type="datetime1">
               <a:rPr lang="en-US" smtClean="0"/>
-              <a:t>3/18/2021</a:t>
+              <a:t>3/24/2021</a:t>
             </a:fld>
             <a:endParaRPr lang="en-US"/>
           </a:p>
@@ -6750,7 +6750,7 @@
           <a:p>
             <a:fld id="{DDE3319A-DB6F-4D9E-8AC7-36F6CFA8A881}" type="datetime1">
               <a:rPr lang="en-US" smtClean="0"/>
-              <a:t>3/18/2021</a:t>
+              <a:t>3/24/2021</a:t>
             </a:fld>
             <a:endParaRPr lang="en-US"/>
           </a:p>
@@ -7001,7 +7001,7 @@
           <a:p>
             <a:fld id="{61DDD1FB-837C-481A-85BA-A895D31EFBFA}" type="datetime1">
               <a:rPr lang="en-US" smtClean="0"/>
-              <a:t>3/18/2021</a:t>
+              <a:t>3/24/2021</a:t>
             </a:fld>
             <a:endParaRPr lang="en-US"/>
           </a:p>
@@ -7258,7 +7258,7 @@
           <a:p>
             <a:fld id="{384C67AF-88C4-4875-B66E-A66C53E68BCB}" type="datetime1">
               <a:rPr lang="en-US" smtClean="0"/>
-              <a:t>3/18/2021</a:t>
+              <a:t>3/24/2021</a:t>
             </a:fld>
             <a:endParaRPr lang="en-US"/>
           </a:p>
@@ -7997,7 +7997,7 @@
           <a:p>
             <a:fld id="{A19010FC-F161-4142-8911-536940E82B9A}" type="datetime1">
               <a:rPr lang="en-US" smtClean="0"/>
-              <a:t>3/18/2021</a:t>
+              <a:t>3/24/2021</a:t>
             </a:fld>
             <a:endParaRPr lang="en-US"/>
           </a:p>
@@ -13749,7 +13749,7 @@
             <p:ph idx="1"/>
             <p:extLst>
               <p:ext uri="{D42A27DB-BD31-4B8C-83A1-F6EECF244321}">
-                <p14:modId xmlns:p14="http://schemas.microsoft.com/office/powerpoint/2010/main" val="1144352103"/>
+                <p14:modId xmlns:p14="http://schemas.microsoft.com/office/powerpoint/2010/main" val="176582026"/>
               </p:ext>
             </p:extLst>
           </p:nvPr>
@@ -13765,14 +13765,14 @@
                 <a:tableStyleId>{5C22544A-7EE6-4342-B048-85BDC9FD1C3A}</a:tableStyleId>
               </a:tblPr>
               <a:tblGrid>
-                <a:gridCol w="1473843">
+                <a:gridCol w="1279671">
                   <a:extLst>
                     <a:ext uri="{9D8B030D-6E8A-4147-A177-3AD203B41FA5}">
                       <a16:colId xmlns:a16="http://schemas.microsoft.com/office/drawing/2014/main" val="1102840721"/>
                     </a:ext>
                   </a:extLst>
                 </a:gridCol>
-                <a:gridCol w="4533359">
+                <a:gridCol w="4727531">
                   <a:extLst>
                     <a:ext uri="{9D8B030D-6E8A-4147-A177-3AD203B41FA5}">
                       <a16:colId xmlns:a16="http://schemas.microsoft.com/office/drawing/2014/main" val="3435659896"/>
@@ -13863,14 +13863,9 @@
                     <a:lstStyle/>
                     <a:p>
                       <a:r>
-                        <a:rPr lang="en-US"/>
-                        <a:t>Matches 0 or more of the previous </a:t>
+                        <a:rPr lang="en-US" dirty="0"/>
+                        <a:t>Matches 0 or more of the previous element</a:t>
                       </a:r>
-                      <a:r>
-                        <a:rPr lang="en-US" err="1"/>
-                        <a:t>elemnt</a:t>
-                      </a:r>
-                      <a:endParaRPr lang="en-US"/>
                     </a:p>
                   </a:txBody>
                   <a:tcPr/>
@@ -13923,14 +13918,14 @@
                     <a:lstStyle/>
                     <a:p>
                       <a:r>
-                        <a:rPr lang="en-US"/>
-                        <a:t>Matches 1 or more of the previous </a:t>
+                        <a:rPr lang="en-US" dirty="0"/>
+                        <a:t>Matches 1 or more of the </a:t>
                       </a:r>
                       <a:r>
-                        <a:rPr lang="en-US" err="1"/>
-                        <a:t>elemnt</a:t>
+                        <a:rPr lang="en-US"/>
+                        <a:t>previous element</a:t>
                       </a:r>
-                      <a:endParaRPr lang="en-US"/>
+                      <a:endParaRPr lang="en-US" dirty="0"/>
                     </a:p>
                   </a:txBody>
                   <a:tcPr/>

</xml_diff>